<commit_message>
feat(3_derivation): update 中 ppt, code
</commit_message>
<xml_diff>
--- a/lessons/3_derivation/ppt/全连接层的前向和后向传播推导（下）.pptx
+++ b/lessons/3_derivation/ppt/全连接层的前向和后向传播推导（下）.pptx
@@ -234,7 +234,7 @@
                 <a:latin typeface="微软雅黑" panose="020B0503020204020204" charset="-122"/>
                 <a:ea typeface="微软雅黑" panose="020B0503020204020204" charset="-122"/>
               </a:rPr>
-              <a:t>2022/10/30</a:t>
+              <a:t>2022/10/31</a:t>
             </a:fld>
             <a:endParaRPr lang="zh-CN" altLang="en-US">
               <a:latin typeface="微软雅黑" panose="020B0503020204020204" charset="-122"/>
@@ -417,7 +417,7 @@
           <a:p>
             <a:fld id="{1AC49D05-6128-4D0D-A32A-06A5E73B386C}" type="datetimeFigureOut">
               <a:rPr lang="zh-CN" altLang="en-US" smtClean="0"/>
-              <a:t>2022/10/30</a:t>
+              <a:t>2022/10/31</a:t>
             </a:fld>
             <a:endParaRPr lang="zh-CN" altLang="en-US"/>
           </a:p>
@@ -1079,7 +1079,7 @@
           <a:p>
             <a:fld id="{9EFD9D74-47D9-4702-A33C-335B63B48DBF}" type="datetimeFigureOut">
               <a:rPr lang="zh-CN" altLang="en-US" smtClean="0"/>
-              <a:t>2022/10/30</a:t>
+              <a:t>2022/10/31</a:t>
             </a:fld>
             <a:endParaRPr lang="zh-CN" altLang="en-US" dirty="0"/>
           </a:p>
@@ -1412,7 +1412,7 @@
           <a:p>
             <a:fld id="{760FBDFE-C587-4B4C-A407-44438C67B59E}" type="datetimeFigureOut">
               <a:rPr lang="zh-CN" altLang="en-US" smtClean="0"/>
-              <a:t>2022/10/30</a:t>
+              <a:t>2022/10/31</a:t>
             </a:fld>
             <a:endParaRPr lang="zh-CN" altLang="en-US"/>
           </a:p>
@@ -1585,7 +1585,7 @@
           <a:p>
             <a:fld id="{9EFD9D74-47D9-4702-A33C-335B63B48DBF}" type="datetimeFigureOut">
               <a:rPr lang="zh-CN" altLang="en-US" smtClean="0"/>
-              <a:t>2022/10/30</a:t>
+              <a:t>2022/10/31</a:t>
             </a:fld>
             <a:endParaRPr lang="zh-CN" altLang="en-US" dirty="0"/>
           </a:p>
@@ -2110,7 +2110,7 @@
           <a:p>
             <a:fld id="{760FBDFE-C587-4B4C-A407-44438C67B59E}" type="datetimeFigureOut">
               <a:rPr lang="zh-CN" altLang="en-US" smtClean="0"/>
-              <a:t>2022/10/30</a:t>
+              <a:t>2022/10/31</a:t>
             </a:fld>
             <a:endParaRPr lang="zh-CN" altLang="en-US"/>
           </a:p>
@@ -2858,7 +2858,7 @@
           <a:p>
             <a:fld id="{760FBDFE-C587-4B4C-A407-44438C67B59E}" type="datetimeFigureOut">
               <a:rPr lang="zh-CN" altLang="en-US" smtClean="0"/>
-              <a:t>2022/10/30</a:t>
+              <a:t>2022/10/31</a:t>
             </a:fld>
             <a:endParaRPr lang="zh-CN" altLang="en-US"/>
           </a:p>
@@ -3024,7 +3024,7 @@
           <a:p>
             <a:fld id="{760FBDFE-C587-4B4C-A407-44438C67B59E}" type="datetimeFigureOut">
               <a:rPr lang="zh-CN" altLang="en-US" smtClean="0"/>
-              <a:t>2022/10/30</a:t>
+              <a:t>2022/10/31</a:t>
             </a:fld>
             <a:endParaRPr lang="zh-CN" altLang="en-US"/>
           </a:p>
@@ -3138,7 +3138,7 @@
           <a:p>
             <a:fld id="{760FBDFE-C587-4B4C-A407-44438C67B59E}" type="datetimeFigureOut">
               <a:rPr lang="zh-CN" altLang="en-US" smtClean="0"/>
-              <a:t>2022/10/30</a:t>
+              <a:t>2022/10/31</a:t>
             </a:fld>
             <a:endParaRPr lang="zh-CN" altLang="en-US"/>
           </a:p>
@@ -3468,7 +3468,7 @@
           <a:p>
             <a:fld id="{9EFD9D74-47D9-4702-A33C-335B63B48DBF}" type="datetimeFigureOut">
               <a:rPr lang="zh-CN" altLang="en-US" smtClean="0"/>
-              <a:t>2022/10/30</a:t>
+              <a:t>2022/10/31</a:t>
             </a:fld>
             <a:endParaRPr lang="zh-CN" altLang="en-US" dirty="0"/>
           </a:p>
@@ -3981,7 +3981,7 @@
           <a:p>
             <a:fld id="{760FBDFE-C587-4B4C-A407-44438C67B59E}" type="datetimeFigureOut">
               <a:rPr lang="zh-CN" altLang="en-US" smtClean="0"/>
-              <a:t>2022/10/30</a:t>
+              <a:t>2022/10/31</a:t>
             </a:fld>
             <a:endParaRPr lang="zh-CN" altLang="en-US"/>
           </a:p>
@@ -4095,7 +4095,7 @@
           <a:p>
             <a:fld id="{760FBDFE-C587-4B4C-A407-44438C67B59E}" type="datetimeFigureOut">
               <a:rPr lang="zh-CN" altLang="en-US" smtClean="0"/>
-              <a:t>2022/10/30</a:t>
+              <a:t>2022/10/31</a:t>
             </a:fld>
             <a:endParaRPr lang="zh-CN" altLang="en-US"/>
           </a:p>
@@ -4383,7 +4383,7 @@
           <a:p>
             <a:fld id="{82F288E0-7875-42C4-84C8-98DBBD3BF4D2}" type="datetimeFigureOut">
               <a:rPr lang="zh-CN" altLang="en-US" smtClean="0"/>
-              <a:t>2022/10/30</a:t>
+              <a:t>2022/10/31</a:t>
             </a:fld>
             <a:endParaRPr lang="zh-CN" altLang="en-US"/>
           </a:p>
@@ -4842,7 +4842,7 @@
           <a:p>
             <a:fld id="{760FBDFE-C587-4B4C-A407-44438C67B59E}" type="datetimeFigureOut">
               <a:rPr lang="zh-CN" altLang="en-US" smtClean="0"/>
-              <a:t>2022/10/30</a:t>
+              <a:t>2022/10/31</a:t>
             </a:fld>
             <a:endParaRPr lang="zh-CN" altLang="en-US"/>
           </a:p>
@@ -5511,7 +5511,7 @@
           <a:p>
             <a:fld id="{9EFD9D74-47D9-4702-A33C-335B63B48DBF}" type="datetimeFigureOut">
               <a:rPr lang="zh-CN" altLang="en-US" smtClean="0"/>
-              <a:t>2022/10/30</a:t>
+              <a:t>2022/10/31</a:t>
             </a:fld>
             <a:endParaRPr lang="zh-CN" altLang="en-US" dirty="0"/>
           </a:p>
@@ -5659,7 +5659,7 @@
           <a:p>
             <a:fld id="{9EFD9D74-47D9-4702-A33C-335B63B48DBF}" type="datetimeFigureOut">
               <a:rPr lang="zh-CN" altLang="en-US" smtClean="0"/>
-              <a:t>2022/10/30</a:t>
+              <a:t>2022/10/31</a:t>
             </a:fld>
             <a:endParaRPr lang="zh-CN" altLang="en-US" dirty="0"/>
           </a:p>
@@ -6485,8 +6485,8 @@
           <a:chExt cx="0" cy="0"/>
         </a:xfrm>
       </p:grpSpPr>
-      <mc:AlternateContent xmlns:mc="http://schemas.openxmlformats.org/markup-compatibility/2006">
-        <mc:Choice xmlns:a14="http://schemas.microsoft.com/office/drawing/2010/main" Requires="a14">
+      <mc:AlternateContent xmlns:mc="http://schemas.openxmlformats.org/markup-compatibility/2006" xmlns:a14="http://schemas.microsoft.com/office/drawing/2010/main">
+        <mc:Choice Requires="a14">
           <p:sp>
             <p:nvSpPr>
               <p:cNvPr id="2" name="文本占位符 1"/>
@@ -6670,7 +6670,7 @@
             </p:txBody>
           </p:sp>
         </mc:Choice>
-        <mc:Fallback>
+        <mc:Fallback xmlns="">
           <p:sp>
             <p:nvSpPr>
               <p:cNvPr id="2" name="文本占位符 1"/>
@@ -6961,8 +6961,8 @@
           <a:chExt cx="0" cy="0"/>
         </a:xfrm>
       </p:grpSpPr>
-      <mc:AlternateContent xmlns:mc="http://schemas.openxmlformats.org/markup-compatibility/2006">
-        <mc:Choice xmlns:a14="http://schemas.microsoft.com/office/drawing/2010/main" Requires="a14">
+      <mc:AlternateContent xmlns:mc="http://schemas.openxmlformats.org/markup-compatibility/2006" xmlns:a14="http://schemas.microsoft.com/office/drawing/2010/main">
+        <mc:Choice Requires="a14">
           <p:sp>
             <p:nvSpPr>
               <p:cNvPr id="2" name="文本占位符 1"/>
@@ -7150,7 +7150,7 @@
             </p:txBody>
           </p:sp>
         </mc:Choice>
-        <mc:Fallback>
+        <mc:Fallback xmlns="">
           <p:sp>
             <p:nvSpPr>
               <p:cNvPr id="2" name="文本占位符 1"/>
@@ -9034,22 +9034,6 @@
             <a:pPr>
               <a:buFont typeface="Arial" panose="020B0604020202020204" pitchFamily="34" charset="0"/>
             </a:pPr>
-            <a:r>
-              <a:rPr lang="zh-CN" altLang="en-US" dirty="0"/>
-              <a:t>第三节</a:t>
-            </a:r>
-            <a:r>
-              <a:rPr lang="zh-CN" altLang="en-US"/>
-              <a:t>课：全</a:t>
-            </a:r>
-            <a:r>
-              <a:rPr lang="zh-CN" altLang="en-US" dirty="0"/>
-              <a:t>连接层的前向和后向传播</a:t>
-            </a:r>
-            <a:r>
-              <a:rPr lang="zh-CN" altLang="en-US"/>
-              <a:t>推导（下）</a:t>
-            </a:r>
             <a:endParaRPr dirty="0">
               <a:sym typeface="+mn-ea"/>
             </a:endParaRPr>
@@ -10060,8 +10044,8 @@
           <a:chExt cx="0" cy="0"/>
         </a:xfrm>
       </p:grpSpPr>
-      <mc:AlternateContent xmlns:mc="http://schemas.openxmlformats.org/markup-compatibility/2006">
-        <mc:Choice xmlns:a14="http://schemas.microsoft.com/office/drawing/2010/main" Requires="a14">
+      <mc:AlternateContent xmlns:mc="http://schemas.openxmlformats.org/markup-compatibility/2006" xmlns:a14="http://schemas.microsoft.com/office/drawing/2010/main">
+        <mc:Choice Requires="a14">
           <p:sp>
             <p:nvSpPr>
               <p:cNvPr id="2" name="文本占位符 1"/>
@@ -10209,7 +10193,7 @@
             </p:txBody>
           </p:sp>
         </mc:Choice>
-        <mc:Fallback>
+        <mc:Fallback xmlns="">
           <p:sp>
             <p:nvSpPr>
               <p:cNvPr id="2" name="文本占位符 1"/>
@@ -10648,8 +10632,8 @@
           <a:chExt cx="0" cy="0"/>
         </a:xfrm>
       </p:grpSpPr>
-      <mc:AlternateContent xmlns:mc="http://schemas.openxmlformats.org/markup-compatibility/2006">
-        <mc:Choice xmlns:a14="http://schemas.microsoft.com/office/drawing/2010/main" Requires="a14">
+      <mc:AlternateContent xmlns:mc="http://schemas.openxmlformats.org/markup-compatibility/2006" xmlns:a14="http://schemas.microsoft.com/office/drawing/2010/main">
+        <mc:Choice Requires="a14">
           <p:sp>
             <p:nvSpPr>
               <p:cNvPr id="2" name="文本占位符 1"/>
@@ -10798,7 +10782,7 @@
             </p:txBody>
           </p:sp>
         </mc:Choice>
-        <mc:Fallback>
+        <mc:Fallback xmlns="">
           <p:sp>
             <p:nvSpPr>
               <p:cNvPr id="2" name="文本占位符 1"/>

</xml_diff>